<commit_message>
Revise and refine text and model
</commit_message>
<xml_diff>
--- a/paper/figs/cwp.pptx
+++ b/paper/figs/cwp.pptx
@@ -104,6 +104,11 @@
       </a:defRPr>
     </a:lvl9pPr>
   </p:defaultTextStyle>
+  <p:extLst>
+    <p:ext uri="{EFAFB233-063F-42B5-8137-9DF3F51BA10A}">
+      <p15:sldGuideLst xmlns:p15="http://schemas.microsoft.com/office/powerpoint/2012/main"/>
+    </p:ext>
+  </p:extLst>
 </p:presentation>
 </file>
 
@@ -254,7 +259,7 @@
           <a:p>
             <a:fld id="{6A426ADD-797B-F548-BB41-FA457F18F1DD}" type="datetimeFigureOut">
               <a:rPr lang="en-US" smtClean="0"/>
-              <a:t>5/10/21</a:t>
+              <a:t>5/11/21</a:t>
             </a:fld>
             <a:endParaRPr lang="en-US"/>
           </a:p>
@@ -452,7 +457,7 @@
           <a:p>
             <a:fld id="{6A426ADD-797B-F548-BB41-FA457F18F1DD}" type="datetimeFigureOut">
               <a:rPr lang="en-US" smtClean="0"/>
-              <a:t>5/10/21</a:t>
+              <a:t>5/11/21</a:t>
             </a:fld>
             <a:endParaRPr lang="en-US"/>
           </a:p>
@@ -660,7 +665,7 @@
           <a:p>
             <a:fld id="{6A426ADD-797B-F548-BB41-FA457F18F1DD}" type="datetimeFigureOut">
               <a:rPr lang="en-US" smtClean="0"/>
-              <a:t>5/10/21</a:t>
+              <a:t>5/11/21</a:t>
             </a:fld>
             <a:endParaRPr lang="en-US"/>
           </a:p>
@@ -858,7 +863,7 @@
           <a:p>
             <a:fld id="{6A426ADD-797B-F548-BB41-FA457F18F1DD}" type="datetimeFigureOut">
               <a:rPr lang="en-US" smtClean="0"/>
-              <a:t>5/10/21</a:t>
+              <a:t>5/11/21</a:t>
             </a:fld>
             <a:endParaRPr lang="en-US"/>
           </a:p>
@@ -1133,7 +1138,7 @@
           <a:p>
             <a:fld id="{6A426ADD-797B-F548-BB41-FA457F18F1DD}" type="datetimeFigureOut">
               <a:rPr lang="en-US" smtClean="0"/>
-              <a:t>5/10/21</a:t>
+              <a:t>5/11/21</a:t>
             </a:fld>
             <a:endParaRPr lang="en-US"/>
           </a:p>
@@ -1398,7 +1403,7 @@
           <a:p>
             <a:fld id="{6A426ADD-797B-F548-BB41-FA457F18F1DD}" type="datetimeFigureOut">
               <a:rPr lang="en-US" smtClean="0"/>
-              <a:t>5/10/21</a:t>
+              <a:t>5/11/21</a:t>
             </a:fld>
             <a:endParaRPr lang="en-US"/>
           </a:p>
@@ -1810,7 +1815,7 @@
           <a:p>
             <a:fld id="{6A426ADD-797B-F548-BB41-FA457F18F1DD}" type="datetimeFigureOut">
               <a:rPr lang="en-US" smtClean="0"/>
-              <a:t>5/10/21</a:t>
+              <a:t>5/11/21</a:t>
             </a:fld>
             <a:endParaRPr lang="en-US"/>
           </a:p>
@@ -1951,7 +1956,7 @@
           <a:p>
             <a:fld id="{6A426ADD-797B-F548-BB41-FA457F18F1DD}" type="datetimeFigureOut">
               <a:rPr lang="en-US" smtClean="0"/>
-              <a:t>5/10/21</a:t>
+              <a:t>5/11/21</a:t>
             </a:fld>
             <a:endParaRPr lang="en-US"/>
           </a:p>
@@ -2064,7 +2069,7 @@
           <a:p>
             <a:fld id="{6A426ADD-797B-F548-BB41-FA457F18F1DD}" type="datetimeFigureOut">
               <a:rPr lang="en-US" smtClean="0"/>
-              <a:t>5/10/21</a:t>
+              <a:t>5/11/21</a:t>
             </a:fld>
             <a:endParaRPr lang="en-US"/>
           </a:p>
@@ -2375,7 +2380,7 @@
           <a:p>
             <a:fld id="{6A426ADD-797B-F548-BB41-FA457F18F1DD}" type="datetimeFigureOut">
               <a:rPr lang="en-US" smtClean="0"/>
-              <a:t>5/10/21</a:t>
+              <a:t>5/11/21</a:t>
             </a:fld>
             <a:endParaRPr lang="en-US"/>
           </a:p>
@@ -2663,7 +2668,7 @@
           <a:p>
             <a:fld id="{6A426ADD-797B-F548-BB41-FA457F18F1DD}" type="datetimeFigureOut">
               <a:rPr lang="en-US" smtClean="0"/>
-              <a:t>5/10/21</a:t>
+              <a:t>5/11/21</a:t>
             </a:fld>
             <a:endParaRPr lang="en-US"/>
           </a:p>
@@ -2904,7 +2909,7 @@
           <a:p>
             <a:fld id="{6A426ADD-797B-F548-BB41-FA457F18F1DD}" type="datetimeFigureOut">
               <a:rPr lang="en-US" smtClean="0"/>
-              <a:t>5/10/21</a:t>
+              <a:t>5/11/21</a:t>
             </a:fld>
             <a:endParaRPr lang="en-US"/>
           </a:p>
@@ -3577,13 +3582,14 @@
           </p:cNvPr>
           <p:cNvCxnSpPr>
             <a:cxnSpLocks/>
+            <a:stCxn id="37" idx="2"/>
           </p:cNvCxnSpPr>
           <p:nvPr/>
         </p:nvCxnSpPr>
         <p:spPr>
-          <a:xfrm>
-            <a:off x="3713733" y="649995"/>
-            <a:ext cx="0" cy="855099"/>
+          <a:xfrm flipH="1">
+            <a:off x="3713733" y="886975"/>
+            <a:ext cx="2888898" cy="618119"/>
           </a:xfrm>
           <a:prstGeom prst="straightConnector1">
             <a:avLst/>
@@ -3622,13 +3628,15 @@
         </p:nvSpPr>
         <p:spPr>
           <a:xfrm>
-            <a:off x="3811691" y="607310"/>
+            <a:off x="2973712" y="652745"/>
             <a:ext cx="2401674" cy="646331"/>
           </a:xfrm>
           <a:prstGeom prst="rect">
             <a:avLst/>
           </a:prstGeom>
-          <a:noFill/>
+          <a:solidFill>
+            <a:schemeClr val="bg1"/>
+          </a:solidFill>
         </p:spPr>
         <p:txBody>
           <a:bodyPr wrap="square" rtlCol="0">
@@ -3664,13 +3672,14 @@
           </p:cNvPr>
           <p:cNvCxnSpPr>
             <a:cxnSpLocks/>
+            <a:stCxn id="37" idx="2"/>
           </p:cNvCxnSpPr>
           <p:nvPr/>
         </p:nvCxnSpPr>
         <p:spPr>
-          <a:xfrm flipH="1">
-            <a:off x="9720067" y="649995"/>
-            <a:ext cx="3967" cy="1886016"/>
+          <a:xfrm>
+            <a:off x="6602631" y="886975"/>
+            <a:ext cx="3117437" cy="1649036"/>
           </a:xfrm>
           <a:prstGeom prst="straightConnector1">
             <a:avLst/>
@@ -3711,7 +3720,7 @@
             </p:nvSpPr>
             <p:spPr>
               <a:xfrm>
-                <a:off x="8955481" y="1195642"/>
+                <a:off x="7725159" y="1195641"/>
                 <a:ext cx="2645491" cy="646331"/>
               </a:xfrm>
               <a:prstGeom prst="rect">
@@ -3779,7 +3788,7 @@
             </p:nvSpPr>
             <p:spPr>
               <a:xfrm>
-                <a:off x="8955481" y="1195642"/>
+                <a:off x="7725159" y="1195641"/>
                 <a:ext cx="2645491" cy="646331"/>
               </a:xfrm>
               <a:prstGeom prst="rect">
@@ -3788,7 +3797,7 @@
               <a:blipFill>
                 <a:blip r:embed="rId2"/>
                 <a:stretch>
-                  <a:fillRect l="-1435" t="-1923" b="-15385"/>
+                  <a:fillRect l="-1429" t="-1923" b="-15385"/>
                 </a:stretch>
               </a:blipFill>
             </p:spPr>
@@ -3930,8 +3939,8 @@
           </a:fontRef>
         </p:style>
       </p:cxnSp>
-      <mc:AlternateContent xmlns:mc="http://schemas.openxmlformats.org/markup-compatibility/2006">
-        <mc:Choice xmlns:a14="http://schemas.microsoft.com/office/drawing/2010/main" Requires="a14">
+      <mc:AlternateContent xmlns:mc="http://schemas.openxmlformats.org/markup-compatibility/2006" xmlns:a14="http://schemas.microsoft.com/office/drawing/2010/main">
+        <mc:Choice Requires="a14">
           <p:sp>
             <p:nvSpPr>
               <p:cNvPr id="21" name="TextBox 20">
@@ -4005,7 +4014,7 @@
             </p:txBody>
           </p:sp>
         </mc:Choice>
-        <mc:Fallback>
+        <mc:Fallback xmlns="">
           <p:sp>
             <p:nvSpPr>
               <p:cNvPr id="21" name="TextBox 20">
@@ -4311,8 +4320,8 @@
           </a:p>
         </p:txBody>
       </p:sp>
-      <mc:AlternateContent xmlns:mc="http://schemas.openxmlformats.org/markup-compatibility/2006">
-        <mc:Choice xmlns:a14="http://schemas.microsoft.com/office/drawing/2010/main" Requires="a14">
+      <mc:AlternateContent xmlns:mc="http://schemas.openxmlformats.org/markup-compatibility/2006" xmlns:a14="http://schemas.microsoft.com/office/drawing/2010/main">
+        <mc:Choice Requires="a14">
           <p:sp>
             <p:nvSpPr>
               <p:cNvPr id="49" name="TextBox 48">
@@ -4378,7 +4387,7 @@
             </p:txBody>
           </p:sp>
         </mc:Choice>
-        <mc:Fallback>
+        <mc:Fallback xmlns="">
           <p:sp>
             <p:nvSpPr>
               <p:cNvPr id="49" name="TextBox 48">
@@ -4606,7 +4615,7 @@
         </p:nvSpPr>
         <p:spPr>
           <a:xfrm>
-            <a:off x="3323370" y="787585"/>
+            <a:off x="4587674" y="558787"/>
             <a:ext cx="389766" cy="461665"/>
           </a:xfrm>
           <a:prstGeom prst="rect">
@@ -4646,7 +4655,7 @@
         </p:nvSpPr>
         <p:spPr>
           <a:xfrm>
-            <a:off x="9313028" y="1841972"/>
+            <a:off x="7966466" y="834021"/>
             <a:ext cx="389766" cy="461665"/>
           </a:xfrm>
           <a:prstGeom prst="rect">
@@ -5069,6 +5078,55 @@
                 <a:srgbClr val="C00000"/>
               </a:solidFill>
             </a:endParaRPr>
+          </a:p>
+        </p:txBody>
+      </p:sp>
+      <p:sp>
+        <p:nvSpPr>
+          <p:cNvPr id="37" name="Rounded Rectangle 36">
+            <a:extLst>
+              <a:ext uri="{FF2B5EF4-FFF2-40B4-BE49-F238E27FC236}">
+                <a16:creationId xmlns:a16="http://schemas.microsoft.com/office/drawing/2014/main" id="{9DDC3E6D-3A37-B946-9449-66DE0842CFEE}"/>
+              </a:ext>
+            </a:extLst>
+          </p:cNvPr>
+          <p:cNvSpPr/>
+          <p:nvPr/>
+        </p:nvSpPr>
+        <p:spPr>
+          <a:xfrm>
+            <a:off x="5479506" y="157927"/>
+            <a:ext cx="2246250" cy="729048"/>
+          </a:xfrm>
+          <a:prstGeom prst="roundRect">
+            <a:avLst/>
+          </a:prstGeom>
+        </p:spPr>
+        <p:style>
+          <a:lnRef idx="2">
+            <a:schemeClr val="accent6">
+              <a:shade val="50000"/>
+            </a:schemeClr>
+          </a:lnRef>
+          <a:fillRef idx="1">
+            <a:schemeClr val="accent6"/>
+          </a:fillRef>
+          <a:effectRef idx="0">
+            <a:schemeClr val="accent6"/>
+          </a:effectRef>
+          <a:fontRef idx="minor">
+            <a:schemeClr val="lt1"/>
+          </a:fontRef>
+        </p:style>
+        <p:txBody>
+          <a:bodyPr rtlCol="0" anchor="ctr"/>
+          <a:lstStyle/>
+          <a:p>
+            <a:pPr algn="ctr"/>
+            <a:r>
+              <a:rPr lang="en-US" sz="2000" dirty="0"/>
+              <a:t>Init</a:t>
+            </a:r>
           </a:p>
         </p:txBody>
       </p:sp>

</xml_diff>